<commit_message>
DP Updates to TF-0 & TF-1 - Initial
Initial updates to add a transaction name to the TF-0 Transactions listing + the SDPi-P Actor model update & transaction table update & placeholder for the DP option description section.
</commit_message>
<xml_diff>
--- a/sources/vol1-diagram-sdpi-p-actor.pptx
+++ b/sources/vol1-diagram-sdpi-p-actor.pptx
@@ -259,7 +259,7 @@
           <a:p>
             <a:fld id="{CEAB79FE-F2B8-4F38-B4B7-E17A89FC2611}" type="datetimeFigureOut">
               <a:rPr lang="en-US" smtClean="0"/>
-              <a:t>11/7/2022</a:t>
+              <a:t>8/14/2024</a:t>
             </a:fld>
             <a:endParaRPr lang="en-US"/>
           </a:p>
@@ -457,7 +457,7 @@
           <a:p>
             <a:fld id="{CEAB79FE-F2B8-4F38-B4B7-E17A89FC2611}" type="datetimeFigureOut">
               <a:rPr lang="en-US" smtClean="0"/>
-              <a:t>11/7/2022</a:t>
+              <a:t>8/14/2024</a:t>
             </a:fld>
             <a:endParaRPr lang="en-US"/>
           </a:p>
@@ -665,7 +665,7 @@
           <a:p>
             <a:fld id="{CEAB79FE-F2B8-4F38-B4B7-E17A89FC2611}" type="datetimeFigureOut">
               <a:rPr lang="en-US" smtClean="0"/>
-              <a:t>11/7/2022</a:t>
+              <a:t>8/14/2024</a:t>
             </a:fld>
             <a:endParaRPr lang="en-US"/>
           </a:p>
@@ -863,7 +863,7 @@
           <a:p>
             <a:fld id="{CEAB79FE-F2B8-4F38-B4B7-E17A89FC2611}" type="datetimeFigureOut">
               <a:rPr lang="en-US" smtClean="0"/>
-              <a:t>11/7/2022</a:t>
+              <a:t>8/14/2024</a:t>
             </a:fld>
             <a:endParaRPr lang="en-US"/>
           </a:p>
@@ -1138,7 +1138,7 @@
           <a:p>
             <a:fld id="{CEAB79FE-F2B8-4F38-B4B7-E17A89FC2611}" type="datetimeFigureOut">
               <a:rPr lang="en-US" smtClean="0"/>
-              <a:t>11/7/2022</a:t>
+              <a:t>8/14/2024</a:t>
             </a:fld>
             <a:endParaRPr lang="en-US"/>
           </a:p>
@@ -1403,7 +1403,7 @@
           <a:p>
             <a:fld id="{CEAB79FE-F2B8-4F38-B4B7-E17A89FC2611}" type="datetimeFigureOut">
               <a:rPr lang="en-US" smtClean="0"/>
-              <a:t>11/7/2022</a:t>
+              <a:t>8/14/2024</a:t>
             </a:fld>
             <a:endParaRPr lang="en-US"/>
           </a:p>
@@ -1815,7 +1815,7 @@
           <a:p>
             <a:fld id="{CEAB79FE-F2B8-4F38-B4B7-E17A89FC2611}" type="datetimeFigureOut">
               <a:rPr lang="en-US" smtClean="0"/>
-              <a:t>11/7/2022</a:t>
+              <a:t>8/14/2024</a:t>
             </a:fld>
             <a:endParaRPr lang="en-US"/>
           </a:p>
@@ -1956,7 +1956,7 @@
           <a:p>
             <a:fld id="{CEAB79FE-F2B8-4F38-B4B7-E17A89FC2611}" type="datetimeFigureOut">
               <a:rPr lang="en-US" smtClean="0"/>
-              <a:t>11/7/2022</a:t>
+              <a:t>8/14/2024</a:t>
             </a:fld>
             <a:endParaRPr lang="en-US"/>
           </a:p>
@@ -2069,7 +2069,7 @@
           <a:p>
             <a:fld id="{CEAB79FE-F2B8-4F38-B4B7-E17A89FC2611}" type="datetimeFigureOut">
               <a:rPr lang="en-US" smtClean="0"/>
-              <a:t>11/7/2022</a:t>
+              <a:t>8/14/2024</a:t>
             </a:fld>
             <a:endParaRPr lang="en-US"/>
           </a:p>
@@ -2380,7 +2380,7 @@
           <a:p>
             <a:fld id="{CEAB79FE-F2B8-4F38-B4B7-E17A89FC2611}" type="datetimeFigureOut">
               <a:rPr lang="en-US" smtClean="0"/>
-              <a:t>11/7/2022</a:t>
+              <a:t>8/14/2024</a:t>
             </a:fld>
             <a:endParaRPr lang="en-US"/>
           </a:p>
@@ -2668,7 +2668,7 @@
           <a:p>
             <a:fld id="{CEAB79FE-F2B8-4F38-B4B7-E17A89FC2611}" type="datetimeFigureOut">
               <a:rPr lang="en-US" smtClean="0"/>
-              <a:t>11/7/2022</a:t>
+              <a:t>8/14/2024</a:t>
             </a:fld>
             <a:endParaRPr lang="en-US"/>
           </a:p>
@@ -2909,7 +2909,7 @@
           <a:p>
             <a:fld id="{CEAB79FE-F2B8-4F38-B4B7-E17A89FC2611}" type="datetimeFigureOut">
               <a:rPr lang="en-US" smtClean="0"/>
-              <a:t>11/7/2022</a:t>
+              <a:t>8/14/2024</a:t>
             </a:fld>
             <a:endParaRPr lang="en-US"/>
           </a:p>
@@ -3340,7 +3340,7 @@
         </p:nvSpPr>
         <p:spPr>
           <a:xfrm>
-            <a:off x="6620503" y="2098336"/>
+            <a:off x="6622508" y="2298914"/>
             <a:ext cx="1800225" cy="738130"/>
           </a:xfrm>
           <a:prstGeom prst="rect">
@@ -3402,7 +3402,7 @@
         </p:nvSpPr>
         <p:spPr>
           <a:xfrm>
-            <a:off x="9605024" y="1355287"/>
+            <a:off x="9107030" y="1547556"/>
             <a:ext cx="1668683" cy="1234744"/>
           </a:xfrm>
           <a:prstGeom prst="rect">
@@ -3450,51 +3450,6 @@
       </p:sp>
       <p:cxnSp>
         <p:nvCxnSpPr>
-          <p:cNvPr id="10" name="Straight Connector 9">
-            <a:extLst>
-              <a:ext uri="{FF2B5EF4-FFF2-40B4-BE49-F238E27FC236}">
-                <a16:creationId xmlns:a16="http://schemas.microsoft.com/office/drawing/2014/main" id="{93EAAAB3-77EF-DA1D-3843-C77EE3D33C34}"/>
-              </a:ext>
-            </a:extLst>
-          </p:cNvPr>
-          <p:cNvCxnSpPr>
-            <a:cxnSpLocks/>
-            <a:endCxn id="9" idx="1"/>
-          </p:cNvCxnSpPr>
-          <p:nvPr/>
-        </p:nvCxnSpPr>
-        <p:spPr>
-          <a:xfrm>
-            <a:off x="8762877" y="1972659"/>
-            <a:ext cx="842147" cy="0"/>
-          </a:xfrm>
-          <a:prstGeom prst="line">
-            <a:avLst/>
-          </a:prstGeom>
-          <a:ln w="19050">
-            <a:solidFill>
-              <a:schemeClr val="tx1"/>
-            </a:solidFill>
-            <a:prstDash val="sysDot"/>
-          </a:ln>
-        </p:spPr>
-        <p:style>
-          <a:lnRef idx="1">
-            <a:schemeClr val="accent1"/>
-          </a:lnRef>
-          <a:fillRef idx="0">
-            <a:schemeClr val="accent1"/>
-          </a:fillRef>
-          <a:effectRef idx="0">
-            <a:schemeClr val="accent1"/>
-          </a:effectRef>
-          <a:fontRef idx="minor">
-            <a:schemeClr val="tx1"/>
-          </a:fontRef>
-        </p:style>
-      </p:cxnSp>
-      <p:cxnSp>
-        <p:nvCxnSpPr>
           <p:cNvPr id="11" name="Straight Connector 10">
             <a:extLst>
               <a:ext uri="{FF2B5EF4-FFF2-40B4-BE49-F238E27FC236}">
@@ -3511,7 +3466,7 @@
         </p:nvCxnSpPr>
         <p:spPr>
           <a:xfrm>
-            <a:off x="3477280" y="2980628"/>
+            <a:off x="4533265" y="3181206"/>
             <a:ext cx="2" cy="471715"/>
           </a:xfrm>
           <a:prstGeom prst="line">
@@ -3552,7 +3507,7 @@
         </p:nvSpPr>
         <p:spPr>
           <a:xfrm>
-            <a:off x="6620503" y="2937044"/>
+            <a:off x="6622508" y="3137622"/>
             <a:ext cx="1800225" cy="738130"/>
           </a:xfrm>
           <a:prstGeom prst="rect">
@@ -3614,7 +3569,7 @@
         </p:nvSpPr>
         <p:spPr>
           <a:xfrm>
-            <a:off x="6250686" y="886940"/>
+            <a:off x="6252691" y="1087518"/>
             <a:ext cx="2512191" cy="4565972"/>
           </a:xfrm>
           <a:prstGeom prst="rect">
@@ -3703,7 +3658,7 @@
         </p:nvSpPr>
         <p:spPr>
           <a:xfrm>
-            <a:off x="6620503" y="3774588"/>
+            <a:off x="6622508" y="3975166"/>
             <a:ext cx="1800225" cy="738130"/>
           </a:xfrm>
           <a:prstGeom prst="rect">
@@ -3765,7 +3720,7 @@
         </p:nvSpPr>
         <p:spPr>
           <a:xfrm>
-            <a:off x="6620503" y="4612132"/>
+            <a:off x="6622508" y="4812710"/>
             <a:ext cx="1800225" cy="738130"/>
           </a:xfrm>
           <a:prstGeom prst="rect">
@@ -3827,7 +3782,7 @@
         </p:nvSpPr>
         <p:spPr>
           <a:xfrm>
-            <a:off x="9605024" y="4612133"/>
+            <a:off x="9107030" y="4804402"/>
             <a:ext cx="1668683" cy="738129"/>
           </a:xfrm>
           <a:prstGeom prst="rect">
@@ -3884,52 +3839,6 @@
           </a:p>
         </p:txBody>
       </p:sp>
-      <p:cxnSp>
-        <p:nvCxnSpPr>
-          <p:cNvPr id="20" name="Straight Connector 19">
-            <a:extLst>
-              <a:ext uri="{FF2B5EF4-FFF2-40B4-BE49-F238E27FC236}">
-                <a16:creationId xmlns:a16="http://schemas.microsoft.com/office/drawing/2014/main" id="{F0B0BFB6-9C92-B45A-3F7E-A09B756D79C1}"/>
-              </a:ext>
-            </a:extLst>
-          </p:cNvPr>
-          <p:cNvCxnSpPr>
-            <a:cxnSpLocks/>
-            <a:stCxn id="18" idx="3"/>
-            <a:endCxn id="19" idx="1"/>
-          </p:cNvCxnSpPr>
-          <p:nvPr/>
-        </p:nvCxnSpPr>
-        <p:spPr>
-          <a:xfrm>
-            <a:off x="8420728" y="4981197"/>
-            <a:ext cx="1184296" cy="1"/>
-          </a:xfrm>
-          <a:prstGeom prst="line">
-            <a:avLst/>
-          </a:prstGeom>
-          <a:ln w="19050">
-            <a:solidFill>
-              <a:schemeClr val="tx1"/>
-            </a:solidFill>
-            <a:prstDash val="sysDot"/>
-          </a:ln>
-        </p:spPr>
-        <p:style>
-          <a:lnRef idx="1">
-            <a:schemeClr val="accent1"/>
-          </a:lnRef>
-          <a:fillRef idx="0">
-            <a:schemeClr val="accent1"/>
-          </a:fillRef>
-          <a:effectRef idx="0">
-            <a:schemeClr val="accent1"/>
-          </a:effectRef>
-          <a:fontRef idx="minor">
-            <a:schemeClr val="tx1"/>
-          </a:fontRef>
-        </p:style>
-      </p:cxnSp>
       <p:grpSp>
         <p:nvGrpSpPr>
           <p:cNvPr id="29" name="Group 28">
@@ -3944,7 +3853,7 @@
         </p:nvGrpSpPr>
         <p:grpSpPr>
           <a:xfrm>
-            <a:off x="2110894" y="1308698"/>
+            <a:off x="3166879" y="1509276"/>
             <a:ext cx="2732771" cy="1671930"/>
             <a:chOff x="794453" y="2574933"/>
             <a:chExt cx="2571746" cy="1738306"/>
@@ -4101,7 +4010,7 @@
         </p:nvGrpSpPr>
         <p:grpSpPr>
           <a:xfrm>
-            <a:off x="2110896" y="3452343"/>
+            <a:off x="3166881" y="3652921"/>
             <a:ext cx="2732771" cy="1738309"/>
             <a:chOff x="713940" y="4718578"/>
             <a:chExt cx="2732771" cy="1738309"/>
@@ -4247,7 +4156,7 @@
         </p:nvSpPr>
         <p:spPr>
           <a:xfrm>
-            <a:off x="6250687" y="1008424"/>
+            <a:off x="6252692" y="1209002"/>
             <a:ext cx="2512189" cy="338554"/>
           </a:xfrm>
           <a:prstGeom prst="rect">
@@ -4278,92 +4187,6 @@
           </a:p>
         </p:txBody>
       </p:sp>
-      <p:cxnSp>
-        <p:nvCxnSpPr>
-          <p:cNvPr id="43" name="Straight Connector 42">
-            <a:extLst>
-              <a:ext uri="{FF2B5EF4-FFF2-40B4-BE49-F238E27FC236}">
-                <a16:creationId xmlns:a16="http://schemas.microsoft.com/office/drawing/2014/main" id="{F87CD351-87BB-04E9-9247-E4675D9D8900}"/>
-              </a:ext>
-            </a:extLst>
-          </p:cNvPr>
-          <p:cNvCxnSpPr>
-            <a:cxnSpLocks/>
-          </p:cNvCxnSpPr>
-          <p:nvPr/>
-        </p:nvCxnSpPr>
-        <p:spPr>
-          <a:xfrm>
-            <a:off x="4843665" y="2200789"/>
-            <a:ext cx="1407021" cy="0"/>
-          </a:xfrm>
-          <a:prstGeom prst="line">
-            <a:avLst/>
-          </a:prstGeom>
-          <a:ln w="19050">
-            <a:solidFill>
-              <a:schemeClr val="tx1"/>
-            </a:solidFill>
-          </a:ln>
-        </p:spPr>
-        <p:style>
-          <a:lnRef idx="1">
-            <a:schemeClr val="accent1"/>
-          </a:lnRef>
-          <a:fillRef idx="0">
-            <a:schemeClr val="accent1"/>
-          </a:fillRef>
-          <a:effectRef idx="0">
-            <a:schemeClr val="accent1"/>
-          </a:effectRef>
-          <a:fontRef idx="minor">
-            <a:schemeClr val="tx1"/>
-          </a:fontRef>
-        </p:style>
-      </p:cxnSp>
-      <p:cxnSp>
-        <p:nvCxnSpPr>
-          <p:cNvPr id="44" name="Straight Connector 43">
-            <a:extLst>
-              <a:ext uri="{FF2B5EF4-FFF2-40B4-BE49-F238E27FC236}">
-                <a16:creationId xmlns:a16="http://schemas.microsoft.com/office/drawing/2014/main" id="{256D6003-A443-0DB2-7DED-44DDF4DA7B9F}"/>
-              </a:ext>
-            </a:extLst>
-          </p:cNvPr>
-          <p:cNvCxnSpPr>
-            <a:cxnSpLocks/>
-          </p:cNvCxnSpPr>
-          <p:nvPr/>
-        </p:nvCxnSpPr>
-        <p:spPr>
-          <a:xfrm>
-            <a:off x="4843665" y="4353582"/>
-            <a:ext cx="1407021" cy="0"/>
-          </a:xfrm>
-          <a:prstGeom prst="line">
-            <a:avLst/>
-          </a:prstGeom>
-          <a:ln w="19050">
-            <a:solidFill>
-              <a:schemeClr val="tx1"/>
-            </a:solidFill>
-          </a:ln>
-        </p:spPr>
-        <p:style>
-          <a:lnRef idx="1">
-            <a:schemeClr val="accent1"/>
-          </a:lnRef>
-          <a:fillRef idx="0">
-            <a:schemeClr val="accent1"/>
-          </a:fillRef>
-          <a:effectRef idx="0">
-            <a:schemeClr val="accent1"/>
-          </a:effectRef>
-          <a:fontRef idx="minor">
-            <a:schemeClr val="tx1"/>
-          </a:fontRef>
-        </p:style>
-      </p:cxnSp>
       <p:grpSp>
         <p:nvGrpSpPr>
           <p:cNvPr id="53" name="Group 52">
@@ -4378,7 +4201,7 @@
         </p:nvGrpSpPr>
         <p:grpSpPr>
           <a:xfrm>
-            <a:off x="918292" y="5229945"/>
+            <a:off x="1974277" y="5430523"/>
             <a:ext cx="3551721" cy="741114"/>
             <a:chOff x="625642" y="5964863"/>
             <a:chExt cx="3551721" cy="741114"/>
@@ -4577,6 +4400,328 @@
           </p:txBody>
         </p:sp>
       </p:grpSp>
+      <p:sp>
+        <p:nvSpPr>
+          <p:cNvPr id="4" name="Rectangle 3">
+            <a:extLst>
+              <a:ext uri="{FF2B5EF4-FFF2-40B4-BE49-F238E27FC236}">
+                <a16:creationId xmlns:a16="http://schemas.microsoft.com/office/drawing/2014/main" id="{EFF533F5-4850-0D99-815B-E4A2802C90EB}"/>
+              </a:ext>
+            </a:extLst>
+          </p:cNvPr>
+          <p:cNvSpPr/>
+          <p:nvPr/>
+        </p:nvSpPr>
+        <p:spPr>
+          <a:xfrm>
+            <a:off x="1524848" y="2790609"/>
+            <a:ext cx="1299882" cy="1241659"/>
+          </a:xfrm>
+          <a:prstGeom prst="rect">
+            <a:avLst/>
+          </a:prstGeom>
+          <a:solidFill>
+            <a:schemeClr val="bg1"/>
+          </a:solidFill>
+          <a:ln w="6350">
+            <a:solidFill>
+              <a:schemeClr val="tx1"/>
+            </a:solidFill>
+          </a:ln>
+        </p:spPr>
+        <p:style>
+          <a:lnRef idx="2">
+            <a:schemeClr val="accent1">
+              <a:shade val="50000"/>
+            </a:schemeClr>
+          </a:lnRef>
+          <a:fillRef idx="1">
+            <a:schemeClr val="accent1"/>
+          </a:fillRef>
+          <a:effectRef idx="0">
+            <a:schemeClr val="accent1"/>
+          </a:effectRef>
+          <a:fontRef idx="minor">
+            <a:schemeClr val="lt1"/>
+          </a:fontRef>
+        </p:style>
+        <p:txBody>
+          <a:bodyPr rtlCol="0" anchor="ctr" anchorCtr="1"/>
+          <a:lstStyle/>
+          <a:p>
+            <a:pPr algn="ctr"/>
+            <a:r>
+              <a:rPr lang="en-US" b="1" dirty="0">
+                <a:solidFill>
+                  <a:schemeClr val="tx1"/>
+                </a:solidFill>
+              </a:rPr>
+              <a:t>SOMDS Discovery Proxy</a:t>
+            </a:r>
+          </a:p>
+        </p:txBody>
+      </p:sp>
+      <p:cxnSp>
+        <p:nvCxnSpPr>
+          <p:cNvPr id="12" name="Straight Connector 11">
+            <a:extLst>
+              <a:ext uri="{FF2B5EF4-FFF2-40B4-BE49-F238E27FC236}">
+                <a16:creationId xmlns:a16="http://schemas.microsoft.com/office/drawing/2014/main" id="{3A29F0CA-5D42-2F73-3EC3-44CB9FE9216A}"/>
+              </a:ext>
+            </a:extLst>
+          </p:cNvPr>
+          <p:cNvCxnSpPr>
+            <a:cxnSpLocks/>
+          </p:cNvCxnSpPr>
+          <p:nvPr/>
+        </p:nvCxnSpPr>
+        <p:spPr>
+          <a:xfrm>
+            <a:off x="2824730" y="2999902"/>
+            <a:ext cx="342149" cy="0"/>
+          </a:xfrm>
+          <a:prstGeom prst="line">
+            <a:avLst/>
+          </a:prstGeom>
+          <a:ln w="19050">
+            <a:solidFill>
+              <a:schemeClr val="tx1"/>
+            </a:solidFill>
+          </a:ln>
+        </p:spPr>
+        <p:style>
+          <a:lnRef idx="1">
+            <a:schemeClr val="accent1"/>
+          </a:lnRef>
+          <a:fillRef idx="0">
+            <a:schemeClr val="accent1"/>
+          </a:fillRef>
+          <a:effectRef idx="0">
+            <a:schemeClr val="accent1"/>
+          </a:effectRef>
+          <a:fontRef idx="minor">
+            <a:schemeClr val="tx1"/>
+          </a:fontRef>
+        </p:style>
+      </p:cxnSp>
+      <p:cxnSp>
+        <p:nvCxnSpPr>
+          <p:cNvPr id="14" name="Straight Connector 13">
+            <a:extLst>
+              <a:ext uri="{FF2B5EF4-FFF2-40B4-BE49-F238E27FC236}">
+                <a16:creationId xmlns:a16="http://schemas.microsoft.com/office/drawing/2014/main" id="{CB9EDDCC-6346-BE91-39CC-0301D9811D0A}"/>
+              </a:ext>
+            </a:extLst>
+          </p:cNvPr>
+          <p:cNvCxnSpPr>
+            <a:cxnSpLocks/>
+          </p:cNvCxnSpPr>
+          <p:nvPr/>
+        </p:nvCxnSpPr>
+        <p:spPr>
+          <a:xfrm>
+            <a:off x="2824729" y="3875752"/>
+            <a:ext cx="342149" cy="0"/>
+          </a:xfrm>
+          <a:prstGeom prst="line">
+            <a:avLst/>
+          </a:prstGeom>
+          <a:ln w="19050">
+            <a:solidFill>
+              <a:schemeClr val="tx1"/>
+            </a:solidFill>
+          </a:ln>
+        </p:spPr>
+        <p:style>
+          <a:lnRef idx="1">
+            <a:schemeClr val="accent1"/>
+          </a:lnRef>
+          <a:fillRef idx="0">
+            <a:schemeClr val="accent1"/>
+          </a:fillRef>
+          <a:effectRef idx="0">
+            <a:schemeClr val="accent1"/>
+          </a:effectRef>
+          <a:fontRef idx="minor">
+            <a:schemeClr val="tx1"/>
+          </a:fontRef>
+        </p:style>
+      </p:cxnSp>
+      <p:cxnSp>
+        <p:nvCxnSpPr>
+          <p:cNvPr id="13" name="Straight Connector 12">
+            <a:extLst>
+              <a:ext uri="{FF2B5EF4-FFF2-40B4-BE49-F238E27FC236}">
+                <a16:creationId xmlns:a16="http://schemas.microsoft.com/office/drawing/2014/main" id="{7A688426-2214-6E89-D9AF-6D48729FF5C1}"/>
+              </a:ext>
+            </a:extLst>
+          </p:cNvPr>
+          <p:cNvCxnSpPr>
+            <a:cxnSpLocks/>
+          </p:cNvCxnSpPr>
+          <p:nvPr/>
+        </p:nvCxnSpPr>
+        <p:spPr>
+          <a:xfrm>
+            <a:off x="5899650" y="2402948"/>
+            <a:ext cx="342149" cy="0"/>
+          </a:xfrm>
+          <a:prstGeom prst="line">
+            <a:avLst/>
+          </a:prstGeom>
+          <a:ln w="19050">
+            <a:solidFill>
+              <a:schemeClr val="tx1"/>
+            </a:solidFill>
+          </a:ln>
+        </p:spPr>
+        <p:style>
+          <a:lnRef idx="1">
+            <a:schemeClr val="accent1"/>
+          </a:lnRef>
+          <a:fillRef idx="0">
+            <a:schemeClr val="accent1"/>
+          </a:fillRef>
+          <a:effectRef idx="0">
+            <a:schemeClr val="accent1"/>
+          </a:effectRef>
+          <a:fontRef idx="minor">
+            <a:schemeClr val="tx1"/>
+          </a:fontRef>
+        </p:style>
+      </p:cxnSp>
+      <p:cxnSp>
+        <p:nvCxnSpPr>
+          <p:cNvPr id="21" name="Straight Connector 20">
+            <a:extLst>
+              <a:ext uri="{FF2B5EF4-FFF2-40B4-BE49-F238E27FC236}">
+                <a16:creationId xmlns:a16="http://schemas.microsoft.com/office/drawing/2014/main" id="{A605404C-B846-F95D-72E2-906C7F8925EC}"/>
+              </a:ext>
+            </a:extLst>
+          </p:cNvPr>
+          <p:cNvCxnSpPr>
+            <a:cxnSpLocks/>
+          </p:cNvCxnSpPr>
+          <p:nvPr/>
+        </p:nvCxnSpPr>
+        <p:spPr>
+          <a:xfrm>
+            <a:off x="5899649" y="4554160"/>
+            <a:ext cx="342149" cy="0"/>
+          </a:xfrm>
+          <a:prstGeom prst="line">
+            <a:avLst/>
+          </a:prstGeom>
+          <a:ln w="19050">
+            <a:solidFill>
+              <a:schemeClr val="tx1"/>
+            </a:solidFill>
+          </a:ln>
+        </p:spPr>
+        <p:style>
+          <a:lnRef idx="1">
+            <a:schemeClr val="accent1"/>
+          </a:lnRef>
+          <a:fillRef idx="0">
+            <a:schemeClr val="accent1"/>
+          </a:fillRef>
+          <a:effectRef idx="0">
+            <a:schemeClr val="accent1"/>
+          </a:effectRef>
+          <a:fontRef idx="minor">
+            <a:schemeClr val="tx1"/>
+          </a:fontRef>
+        </p:style>
+      </p:cxnSp>
+      <p:cxnSp>
+        <p:nvCxnSpPr>
+          <p:cNvPr id="24" name="Straight Connector 23">
+            <a:extLst>
+              <a:ext uri="{FF2B5EF4-FFF2-40B4-BE49-F238E27FC236}">
+                <a16:creationId xmlns:a16="http://schemas.microsoft.com/office/drawing/2014/main" id="{830BB4B2-B0EB-B454-AD66-C22E386537FB}"/>
+              </a:ext>
+            </a:extLst>
+          </p:cNvPr>
+          <p:cNvCxnSpPr>
+            <a:cxnSpLocks/>
+          </p:cNvCxnSpPr>
+          <p:nvPr/>
+        </p:nvCxnSpPr>
+        <p:spPr>
+          <a:xfrm>
+            <a:off x="8764881" y="2173237"/>
+            <a:ext cx="342149" cy="0"/>
+          </a:xfrm>
+          <a:prstGeom prst="line">
+            <a:avLst/>
+          </a:prstGeom>
+          <a:ln w="19050">
+            <a:solidFill>
+              <a:schemeClr val="tx1"/>
+            </a:solidFill>
+            <a:prstDash val="sysDot"/>
+          </a:ln>
+        </p:spPr>
+        <p:style>
+          <a:lnRef idx="1">
+            <a:schemeClr val="accent1"/>
+          </a:lnRef>
+          <a:fillRef idx="0">
+            <a:schemeClr val="accent1"/>
+          </a:fillRef>
+          <a:effectRef idx="0">
+            <a:schemeClr val="accent1"/>
+          </a:effectRef>
+          <a:fontRef idx="minor">
+            <a:schemeClr val="tx1"/>
+          </a:fontRef>
+        </p:style>
+      </p:cxnSp>
+      <p:cxnSp>
+        <p:nvCxnSpPr>
+          <p:cNvPr id="25" name="Straight Connector 24">
+            <a:extLst>
+              <a:ext uri="{FF2B5EF4-FFF2-40B4-BE49-F238E27FC236}">
+                <a16:creationId xmlns:a16="http://schemas.microsoft.com/office/drawing/2014/main" id="{5E42F7CB-B8B1-71E6-73B2-4A580CB91C4D}"/>
+              </a:ext>
+            </a:extLst>
+          </p:cNvPr>
+          <p:cNvCxnSpPr>
+            <a:cxnSpLocks/>
+            <a:stCxn id="18" idx="3"/>
+          </p:cNvCxnSpPr>
+          <p:nvPr/>
+        </p:nvCxnSpPr>
+        <p:spPr>
+          <a:xfrm>
+            <a:off x="8422733" y="5181775"/>
+            <a:ext cx="684297" cy="0"/>
+          </a:xfrm>
+          <a:prstGeom prst="line">
+            <a:avLst/>
+          </a:prstGeom>
+          <a:ln w="19050">
+            <a:solidFill>
+              <a:schemeClr val="tx1"/>
+            </a:solidFill>
+            <a:prstDash val="sysDot"/>
+          </a:ln>
+        </p:spPr>
+        <p:style>
+          <a:lnRef idx="1">
+            <a:schemeClr val="accent1"/>
+          </a:lnRef>
+          <a:fillRef idx="0">
+            <a:schemeClr val="accent1"/>
+          </a:fillRef>
+          <a:effectRef idx="0">
+            <a:schemeClr val="accent1"/>
+          </a:effectRef>
+          <a:fontRef idx="minor">
+            <a:schemeClr val="tx1"/>
+          </a:fontRef>
+        </p:style>
+      </p:cxnSp>
     </p:spTree>
     <p:extLst>
       <p:ext uri="{BB962C8B-B14F-4D97-AF65-F5344CB8AC3E}">

</xml_diff>

<commit_message>
Updated Sequence Diagram & Actor Diagram
Sequence Diagram - added secure groupings for all transactions
Actor Diagram - simplified to "Discovery Proxy"
Updated Change Log with #152 addition
A fix to the TF-1 SDPiP Transactions table to re-enable rendering of the end notes ... hopefully!
</commit_message>
<xml_diff>
--- a/sources/vol1-diagram-sdpi-p-actor.pptx
+++ b/sources/vol1-diagram-sdpi-p-actor.pptx
@@ -259,7 +259,7 @@
           <a:p>
             <a:fld id="{CEAB79FE-F2B8-4F38-B4B7-E17A89FC2611}" type="datetimeFigureOut">
               <a:rPr lang="en-US" smtClean="0"/>
-              <a:t>8/14/2024</a:t>
+              <a:t>8/19/2024</a:t>
             </a:fld>
             <a:endParaRPr lang="en-US"/>
           </a:p>
@@ -457,7 +457,7 @@
           <a:p>
             <a:fld id="{CEAB79FE-F2B8-4F38-B4B7-E17A89FC2611}" type="datetimeFigureOut">
               <a:rPr lang="en-US" smtClean="0"/>
-              <a:t>8/14/2024</a:t>
+              <a:t>8/19/2024</a:t>
             </a:fld>
             <a:endParaRPr lang="en-US"/>
           </a:p>
@@ -665,7 +665,7 @@
           <a:p>
             <a:fld id="{CEAB79FE-F2B8-4F38-B4B7-E17A89FC2611}" type="datetimeFigureOut">
               <a:rPr lang="en-US" smtClean="0"/>
-              <a:t>8/14/2024</a:t>
+              <a:t>8/19/2024</a:t>
             </a:fld>
             <a:endParaRPr lang="en-US"/>
           </a:p>
@@ -863,7 +863,7 @@
           <a:p>
             <a:fld id="{CEAB79FE-F2B8-4F38-B4B7-E17A89FC2611}" type="datetimeFigureOut">
               <a:rPr lang="en-US" smtClean="0"/>
-              <a:t>8/14/2024</a:t>
+              <a:t>8/19/2024</a:t>
             </a:fld>
             <a:endParaRPr lang="en-US"/>
           </a:p>
@@ -1138,7 +1138,7 @@
           <a:p>
             <a:fld id="{CEAB79FE-F2B8-4F38-B4B7-E17A89FC2611}" type="datetimeFigureOut">
               <a:rPr lang="en-US" smtClean="0"/>
-              <a:t>8/14/2024</a:t>
+              <a:t>8/19/2024</a:t>
             </a:fld>
             <a:endParaRPr lang="en-US"/>
           </a:p>
@@ -1403,7 +1403,7 @@
           <a:p>
             <a:fld id="{CEAB79FE-F2B8-4F38-B4B7-E17A89FC2611}" type="datetimeFigureOut">
               <a:rPr lang="en-US" smtClean="0"/>
-              <a:t>8/14/2024</a:t>
+              <a:t>8/19/2024</a:t>
             </a:fld>
             <a:endParaRPr lang="en-US"/>
           </a:p>
@@ -1815,7 +1815,7 @@
           <a:p>
             <a:fld id="{CEAB79FE-F2B8-4F38-B4B7-E17A89FC2611}" type="datetimeFigureOut">
               <a:rPr lang="en-US" smtClean="0"/>
-              <a:t>8/14/2024</a:t>
+              <a:t>8/19/2024</a:t>
             </a:fld>
             <a:endParaRPr lang="en-US"/>
           </a:p>
@@ -1956,7 +1956,7 @@
           <a:p>
             <a:fld id="{CEAB79FE-F2B8-4F38-B4B7-E17A89FC2611}" type="datetimeFigureOut">
               <a:rPr lang="en-US" smtClean="0"/>
-              <a:t>8/14/2024</a:t>
+              <a:t>8/19/2024</a:t>
             </a:fld>
             <a:endParaRPr lang="en-US"/>
           </a:p>
@@ -2069,7 +2069,7 @@
           <a:p>
             <a:fld id="{CEAB79FE-F2B8-4F38-B4B7-E17A89FC2611}" type="datetimeFigureOut">
               <a:rPr lang="en-US" smtClean="0"/>
-              <a:t>8/14/2024</a:t>
+              <a:t>8/19/2024</a:t>
             </a:fld>
             <a:endParaRPr lang="en-US"/>
           </a:p>
@@ -2380,7 +2380,7 @@
           <a:p>
             <a:fld id="{CEAB79FE-F2B8-4F38-B4B7-E17A89FC2611}" type="datetimeFigureOut">
               <a:rPr lang="en-US" smtClean="0"/>
-              <a:t>8/14/2024</a:t>
+              <a:t>8/19/2024</a:t>
             </a:fld>
             <a:endParaRPr lang="en-US"/>
           </a:p>
@@ -2668,7 +2668,7 @@
           <a:p>
             <a:fld id="{CEAB79FE-F2B8-4F38-B4B7-E17A89FC2611}" type="datetimeFigureOut">
               <a:rPr lang="en-US" smtClean="0"/>
-              <a:t>8/14/2024</a:t>
+              <a:t>8/19/2024</a:t>
             </a:fld>
             <a:endParaRPr lang="en-US"/>
           </a:p>
@@ -2909,7 +2909,7 @@
           <a:p>
             <a:fld id="{CEAB79FE-F2B8-4F38-B4B7-E17A89FC2611}" type="datetimeFigureOut">
               <a:rPr lang="en-US" smtClean="0"/>
-              <a:t>8/14/2024</a:t>
+              <a:t>8/19/2024</a:t>
             </a:fld>
             <a:endParaRPr lang="en-US"/>
           </a:p>
@@ -4451,12 +4451,20 @@
           <a:p>
             <a:pPr algn="ctr"/>
             <a:r>
+              <a:rPr lang="en-US" b="1">
+                <a:solidFill>
+                  <a:schemeClr val="tx1"/>
+                </a:solidFill>
+              </a:rPr>
+              <a:t>Discovery </a:t>
+            </a:r>
+            <a:r>
               <a:rPr lang="en-US" b="1" dirty="0">
                 <a:solidFill>
                   <a:schemeClr val="tx1"/>
                 </a:solidFill>
               </a:rPr>
-              <a:t>SOMDS Discovery Proxy</a:t>
+              <a:t>Proxy</a:t>
             </a:r>
           </a:p>
         </p:txBody>

</xml_diff>